<commit_message>
chore: update remote repo
</commit_message>
<xml_diff>
--- a/esi/aula12/atividades/Modelo de apresentação.pptx
+++ b/esi/aula12/atividades/Modelo de apresentação.pptx
@@ -5,7 +5,7 @@
     <p:sldMasterId id="2147483648" r:id="rId1"/>
   </p:sldMasterIdLst>
   <p:notesMasterIdLst>
-    <p:notesMasterId r:id="rId12"/>
+    <p:notesMasterId r:id="rId11"/>
   </p:notesMasterIdLst>
   <p:sldIdLst>
     <p:sldId id="256" r:id="rId2"/>
@@ -16,8 +16,7 @@
     <p:sldId id="265" r:id="rId7"/>
     <p:sldId id="261" r:id="rId8"/>
     <p:sldId id="262" r:id="rId9"/>
-    <p:sldId id="263" r:id="rId10"/>
-    <p:sldId id="264" r:id="rId11"/>
+    <p:sldId id="264" r:id="rId10"/>
   </p:sldIdLst>
   <p:sldSz cx="9144000" cy="6858000" type="screen4x3"/>
   <p:notesSz cx="6858000" cy="9144000"/>
@@ -280,7 +279,7 @@
       </p15:notesGuideLst>
     </p:ext>
     <p:ext uri="GoogleSlidesCustomDataVersion2">
-      <go:slidesCustomData xmlns:go="http://customooxmlschemas.google.com/" xmlns:ahyp="http://schemas.microsoft.com/office/drawing/2018/hyperlinkcolor" xmlns:p15="http://schemas.microsoft.com/office/powerpoint/2012/main" xmlns:p14="http://schemas.microsoft.com/office/powerpoint/2010/main" xmlns:com="http://schemas.openxmlformats.org/drawingml/2006/compatibility" xmlns:pvml="urn:schemas-microsoft-com:office:powerpoint" xmlns:v="urn:schemas-microsoft-com:vml" xmlns:o="urn:schemas-microsoft-com:office:office" xmlns:dgm="http://schemas.openxmlformats.org/drawingml/2006/diagram" xmlns:c="http://schemas.openxmlformats.org/drawingml/2006/chart" xmlns:mv="urn:schemas-microsoft-com:mac:vml" xmlns:mc="http://schemas.openxmlformats.org/markup-compatibility/2006" xmlns="" r:id="rId15" roundtripDataSignature="AMtx7mhOeVnw7EHFy7HMvZVSiat2c4n7WA=="/>
+      <go:slidesCustomData xmlns="" xmlns:mc="http://schemas.openxmlformats.org/markup-compatibility/2006" xmlns:mv="urn:schemas-microsoft-com:mac:vml" xmlns:c="http://schemas.openxmlformats.org/drawingml/2006/chart" xmlns:dgm="http://schemas.openxmlformats.org/drawingml/2006/diagram" xmlns:o="urn:schemas-microsoft-com:office:office" xmlns:v="urn:schemas-microsoft-com:vml" xmlns:pvml="urn:schemas-microsoft-com:office:powerpoint" xmlns:com="http://schemas.openxmlformats.org/drawingml/2006/compatibility" xmlns:p14="http://schemas.microsoft.com/office/powerpoint/2010/main" xmlns:p15="http://schemas.microsoft.com/office/powerpoint/2012/main" xmlns:ahyp="http://schemas.microsoft.com/office/drawing/2018/hyperlinkcolor" xmlns:go="http://customooxmlschemas.google.com/" r:id="rId15" roundtripDataSignature="AMtx7mhOeVnw7EHFy7HMvZVSiat2c4n7WA=="/>
     </p:ext>
   </p:extLst>
 </p:presentation>
@@ -1861,128 +1860,6 @@
 </p:notes>
 </file>
 
-<file path=ppt/notesSlides/notesSlide10.xml><?xml version="1.0" encoding="utf-8"?>
-<p:notes xmlns:a="http://schemas.openxmlformats.org/drawingml/2006/main" xmlns:r="http://schemas.openxmlformats.org/officeDocument/2006/relationships" xmlns:p="http://schemas.openxmlformats.org/presentationml/2006/main" showMasterSp="0" showMasterPhAnim="0">
-  <p:cSld>
-    <p:spTree>
-      <p:nvGrpSpPr>
-        <p:cNvPr id="1" name="Shape 141"/>
-        <p:cNvGrpSpPr/>
-        <p:nvPr/>
-      </p:nvGrpSpPr>
-      <p:grpSpPr>
-        <a:xfrm>
-          <a:off x="0" y="0"/>
-          <a:ext cx="0" cy="0"/>
-          <a:chOff x="0" y="0"/>
-          <a:chExt cx="0" cy="0"/>
-        </a:xfrm>
-      </p:grpSpPr>
-      <p:sp>
-        <p:nvSpPr>
-          <p:cNvPr id="142" name="Google Shape;142;g2d4445bff6b_0_6:notes"/>
-          <p:cNvSpPr txBox="1">
-            <a:spLocks noGrp="1"/>
-          </p:cNvSpPr>
-          <p:nvPr>
-            <p:ph type="body" idx="1"/>
-          </p:nvPr>
-        </p:nvSpPr>
-        <p:spPr>
-          <a:xfrm>
-            <a:off x="685800" y="4343400"/>
-            <a:ext cx="5486400" cy="4114800"/>
-          </a:xfrm>
-          <a:prstGeom prst="rect">
-            <a:avLst/>
-          </a:prstGeom>
-          <a:noFill/>
-          <a:ln>
-            <a:noFill/>
-          </a:ln>
-        </p:spPr>
-        <p:txBody>
-          <a:bodyPr spcFirstLastPara="1" wrap="square" lIns="91425" tIns="45700" rIns="91425" bIns="45700" anchor="t" anchorCtr="0">
-            <a:noAutofit/>
-          </a:bodyPr>
-          <a:lstStyle/>
-          <a:p>
-            <a:pPr marL="0" lvl="0" indent="0" algn="l" rtl="0">
-              <a:lnSpc>
-                <a:spcPct val="100000"/>
-              </a:lnSpc>
-              <a:spcBef>
-                <a:spcPts val="0"/>
-              </a:spcBef>
-              <a:spcAft>
-                <a:spcPts val="0"/>
-              </a:spcAft>
-              <a:buSzPts val="1400"/>
-              <a:buNone/>
-            </a:pPr>
-            <a:endParaRPr/>
-          </a:p>
-        </p:txBody>
-      </p:sp>
-      <p:sp>
-        <p:nvSpPr>
-          <p:cNvPr id="143" name="Google Shape;143;g2d4445bff6b_0_6:notes"/>
-          <p:cNvSpPr>
-            <a:spLocks noGrp="1" noRot="1" noChangeAspect="1"/>
-          </p:cNvSpPr>
-          <p:nvPr>
-            <p:ph type="sldImg" idx="2"/>
-          </p:nvPr>
-        </p:nvSpPr>
-        <p:spPr>
-          <a:xfrm>
-            <a:off x="1143000" y="685800"/>
-            <a:ext cx="4572000" cy="3429000"/>
-          </a:xfrm>
-          <a:custGeom>
-            <a:avLst/>
-            <a:gdLst/>
-            <a:ahLst/>
-            <a:cxnLst/>
-            <a:rect l="l" t="t" r="r" b="b"/>
-            <a:pathLst>
-              <a:path w="120000" h="120000" extrusionOk="0">
-                <a:moveTo>
-                  <a:pt x="0" y="0"/>
-                </a:moveTo>
-                <a:lnTo>
-                  <a:pt x="120000" y="0"/>
-                </a:lnTo>
-                <a:lnTo>
-                  <a:pt x="120000" y="120000"/>
-                </a:lnTo>
-                <a:lnTo>
-                  <a:pt x="0" y="120000"/>
-                </a:lnTo>
-                <a:close/>
-              </a:path>
-            </a:pathLst>
-          </a:custGeom>
-          <a:noFill/>
-          <a:ln w="12700" cap="flat" cmpd="sng">
-            <a:solidFill>
-              <a:srgbClr val="000000"/>
-            </a:solidFill>
-            <a:prstDash val="solid"/>
-            <a:round/>
-            <a:headEnd type="none" w="sm" len="sm"/>
-            <a:tailEnd type="none" w="sm" len="sm"/>
-          </a:ln>
-        </p:spPr>
-      </p:sp>
-    </p:spTree>
-  </p:cSld>
-  <p:clrMapOvr>
-    <a:masterClrMapping/>
-  </p:clrMapOvr>
-</p:notes>
-</file>
-
 <file path=ppt/notesSlides/notesSlide2.xml><?xml version="1.0" encoding="utf-8"?>
 <p:notes xmlns:a="http://schemas.openxmlformats.org/drawingml/2006/main" xmlns:r="http://schemas.openxmlformats.org/officeDocument/2006/relationships" xmlns:p="http://schemas.openxmlformats.org/presentationml/2006/main" showMasterSp="0" showMasterPhAnim="0">
   <p:cSld>
@@ -3249,7 +3126,7 @@
   <p:cSld>
     <p:spTree>
       <p:nvGrpSpPr>
-        <p:cNvPr id="1" name="Shape 134"/>
+        <p:cNvPr id="1" name="Shape 141"/>
         <p:cNvGrpSpPr/>
         <p:nvPr/>
       </p:nvGrpSpPr>
@@ -3263,7 +3140,53 @@
       </p:grpSpPr>
       <p:sp>
         <p:nvSpPr>
-          <p:cNvPr id="135" name="Google Shape;135;g2d4445bff6b_0_29:notes"/>
+          <p:cNvPr id="142" name="Google Shape;142;g2d4445bff6b_0_6:notes"/>
+          <p:cNvSpPr txBox="1">
+            <a:spLocks noGrp="1"/>
+          </p:cNvSpPr>
+          <p:nvPr>
+            <p:ph type="body" idx="1"/>
+          </p:nvPr>
+        </p:nvSpPr>
+        <p:spPr>
+          <a:xfrm>
+            <a:off x="685800" y="4343400"/>
+            <a:ext cx="5486400" cy="4114800"/>
+          </a:xfrm>
+          <a:prstGeom prst="rect">
+            <a:avLst/>
+          </a:prstGeom>
+          <a:noFill/>
+          <a:ln>
+            <a:noFill/>
+          </a:ln>
+        </p:spPr>
+        <p:txBody>
+          <a:bodyPr spcFirstLastPara="1" wrap="square" lIns="91425" tIns="45700" rIns="91425" bIns="45700" anchor="t" anchorCtr="0">
+            <a:noAutofit/>
+          </a:bodyPr>
+          <a:lstStyle/>
+          <a:p>
+            <a:pPr marL="0" lvl="0" indent="0" algn="l" rtl="0">
+              <a:lnSpc>
+                <a:spcPct val="100000"/>
+              </a:lnSpc>
+              <a:spcBef>
+                <a:spcPts val="0"/>
+              </a:spcBef>
+              <a:spcAft>
+                <a:spcPts val="0"/>
+              </a:spcAft>
+              <a:buSzPts val="1400"/>
+              <a:buNone/>
+            </a:pPr>
+            <a:endParaRPr/>
+          </a:p>
+        </p:txBody>
+      </p:sp>
+      <p:sp>
+        <p:nvSpPr>
+          <p:cNvPr id="143" name="Google Shape;143;g2d4445bff6b_0_6:notes"/>
           <p:cNvSpPr>
             <a:spLocks noGrp="1" noRot="1" noChangeAspect="1"/>
           </p:cNvSpPr>
@@ -3311,106 +3234,6 @@
             <a:tailEnd type="none" w="sm" len="sm"/>
           </a:ln>
         </p:spPr>
-      </p:sp>
-      <p:sp>
-        <p:nvSpPr>
-          <p:cNvPr id="136" name="Google Shape;136;g2d4445bff6b_0_29:notes"/>
-          <p:cNvSpPr txBox="1">
-            <a:spLocks noGrp="1"/>
-          </p:cNvSpPr>
-          <p:nvPr>
-            <p:ph type="body" idx="1"/>
-          </p:nvPr>
-        </p:nvSpPr>
-        <p:spPr>
-          <a:xfrm>
-            <a:off x="685800" y="4343400"/>
-            <a:ext cx="5486400" cy="4114800"/>
-          </a:xfrm>
-          <a:prstGeom prst="rect">
-            <a:avLst/>
-          </a:prstGeom>
-          <a:noFill/>
-          <a:ln>
-            <a:noFill/>
-          </a:ln>
-        </p:spPr>
-        <p:txBody>
-          <a:bodyPr spcFirstLastPara="1" wrap="square" lIns="91425" tIns="45700" rIns="91425" bIns="45700" anchor="t" anchorCtr="0">
-            <a:noAutofit/>
-          </a:bodyPr>
-          <a:lstStyle/>
-          <a:p>
-            <a:pPr marL="0" lvl="0" indent="0" algn="l" rtl="0">
-              <a:lnSpc>
-                <a:spcPct val="100000"/>
-              </a:lnSpc>
-              <a:spcBef>
-                <a:spcPts val="0"/>
-              </a:spcBef>
-              <a:spcAft>
-                <a:spcPts val="0"/>
-              </a:spcAft>
-              <a:buSzPts val="1400"/>
-              <a:buNone/>
-            </a:pPr>
-            <a:endParaRPr/>
-          </a:p>
-        </p:txBody>
-      </p:sp>
-      <p:sp>
-        <p:nvSpPr>
-          <p:cNvPr id="137" name="Google Shape;137;g2d4445bff6b_0_29:notes"/>
-          <p:cNvSpPr txBox="1">
-            <a:spLocks noGrp="1"/>
-          </p:cNvSpPr>
-          <p:nvPr>
-            <p:ph type="sldNum" idx="12"/>
-          </p:nvPr>
-        </p:nvSpPr>
-        <p:spPr>
-          <a:xfrm>
-            <a:off x="3884613" y="8685213"/>
-            <a:ext cx="2971800" cy="457200"/>
-          </a:xfrm>
-          <a:prstGeom prst="rect">
-            <a:avLst/>
-          </a:prstGeom>
-          <a:noFill/>
-          <a:ln>
-            <a:noFill/>
-          </a:ln>
-        </p:spPr>
-        <p:txBody>
-          <a:bodyPr spcFirstLastPara="1" wrap="square" lIns="91425" tIns="45700" rIns="91425" bIns="45700" anchor="b" anchorCtr="0">
-            <a:noAutofit/>
-          </a:bodyPr>
-          <a:lstStyle/>
-          <a:p>
-            <a:pPr marL="0" lvl="0" indent="0" algn="r" rtl="0">
-              <a:lnSpc>
-                <a:spcPct val="100000"/>
-              </a:lnSpc>
-              <a:spcBef>
-                <a:spcPts val="0"/>
-              </a:spcBef>
-              <a:spcAft>
-                <a:spcPts val="0"/>
-              </a:spcAft>
-              <a:buClr>
-                <a:srgbClr val="000000"/>
-              </a:buClr>
-              <a:buSzPts val="1200"/>
-              <a:buFont typeface="Arial"/>
-              <a:buNone/>
-            </a:pPr>
-            <a:fld id="{00000000-1234-1234-1234-123412341234}" type="slidenum">
-              <a:rPr lang="pt-BR"/>
-              <a:t>9</a:t>
-            </a:fld>
-            <a:endParaRPr/>
-          </a:p>
-        </p:txBody>
       </p:sp>
     </p:spTree>
   </p:cSld>
@@ -16801,7 +16624,14 @@
             </a:pPr>
             <a:r>
               <a:rPr lang="pt-BR" b="1" dirty="0"/>
-              <a:t>Calçados Avenida</a:t>
+              <a:t>Sistema de e-commerce </a:t>
+            </a:r>
+            <a:br>
+              <a:rPr lang="pt-BR" b="1" dirty="0"/>
+            </a:br>
+            <a:r>
+              <a:rPr lang="pt-BR" b="1" dirty="0"/>
+              <a:t>Pé na Ativa</a:t>
             </a:r>
             <a:endParaRPr sz="3700" b="1" dirty="0"/>
           </a:p>
@@ -16883,184 +16713,6 @@
               <a:rPr lang="pt-BR" dirty="0"/>
               <a:t>Bernardo, Bryan, Eduarda, Valdemar e Yan</a:t>
             </a:r>
-          </a:p>
-          <a:p>
-            <a:pPr marL="0" lvl="0" indent="0" algn="ctr" rtl="0">
-              <a:lnSpc>
-                <a:spcPct val="100000"/>
-              </a:lnSpc>
-              <a:spcBef>
-                <a:spcPts val="640"/>
-              </a:spcBef>
-              <a:spcAft>
-                <a:spcPts val="0"/>
-              </a:spcAft>
-              <a:buClr>
-                <a:schemeClr val="dk2"/>
-              </a:buClr>
-              <a:buSzPts val="3200"/>
-              <a:buNone/>
-            </a:pPr>
-            <a:endParaRPr dirty="0"/>
-          </a:p>
-        </p:txBody>
-      </p:sp>
-    </p:spTree>
-  </p:cSld>
-  <p:clrMapOvr>
-    <a:masterClrMapping/>
-  </p:clrMapOvr>
-</p:sld>
-</file>
-
-<file path=ppt/slides/slide10.xml><?xml version="1.0" encoding="utf-8"?>
-<p:sld xmlns:a="http://schemas.openxmlformats.org/drawingml/2006/main" xmlns:r="http://schemas.openxmlformats.org/officeDocument/2006/relationships" xmlns:p="http://schemas.openxmlformats.org/presentationml/2006/main">
-  <p:cSld>
-    <p:spTree>
-      <p:nvGrpSpPr>
-        <p:cNvPr id="1" name="Shape 144"/>
-        <p:cNvGrpSpPr/>
-        <p:nvPr/>
-      </p:nvGrpSpPr>
-      <p:grpSpPr>
-        <a:xfrm>
-          <a:off x="0" y="0"/>
-          <a:ext cx="0" cy="0"/>
-          <a:chOff x="0" y="0"/>
-          <a:chExt cx="0" cy="0"/>
-        </a:xfrm>
-      </p:grpSpPr>
-      <p:sp>
-        <p:nvSpPr>
-          <p:cNvPr id="145" name="Google Shape;145;g2d4445bff6b_0_6"/>
-          <p:cNvSpPr txBox="1">
-            <a:spLocks noGrp="1"/>
-          </p:cNvSpPr>
-          <p:nvPr>
-            <p:ph type="ctrTitle"/>
-          </p:nvPr>
-        </p:nvSpPr>
-        <p:spPr>
-          <a:xfrm>
-            <a:off x="685800" y="2130425"/>
-            <a:ext cx="7772400" cy="1470000"/>
-          </a:xfrm>
-          <a:prstGeom prst="rect">
-            <a:avLst/>
-          </a:prstGeom>
-          <a:noFill/>
-          <a:ln>
-            <a:noFill/>
-          </a:ln>
-        </p:spPr>
-        <p:txBody>
-          <a:bodyPr spcFirstLastPara="1" wrap="square" lIns="91425" tIns="45700" rIns="91425" bIns="45700" anchor="ctr" anchorCtr="0">
-            <a:normAutofit/>
-          </a:bodyPr>
-          <a:lstStyle/>
-          <a:p>
-            <a:pPr marL="0" lvl="0" indent="0" algn="ctr" rtl="0">
-              <a:lnSpc>
-                <a:spcPct val="100000"/>
-              </a:lnSpc>
-              <a:spcBef>
-                <a:spcPts val="0"/>
-              </a:spcBef>
-              <a:spcAft>
-                <a:spcPts val="0"/>
-              </a:spcAft>
-              <a:buClr>
-                <a:schemeClr val="dk2"/>
-              </a:buClr>
-              <a:buSzPts val="4400"/>
-              <a:buFont typeface="Calibri"/>
-              <a:buNone/>
-            </a:pPr>
-            <a:r>
-              <a:rPr lang="pt-BR" b="1" dirty="0"/>
-              <a:t>Calçados Avenida</a:t>
-            </a:r>
-            <a:endParaRPr sz="3700" b="1" dirty="0"/>
-          </a:p>
-        </p:txBody>
-      </p:sp>
-      <p:sp>
-        <p:nvSpPr>
-          <p:cNvPr id="146" name="Google Shape;146;g2d4445bff6b_0_6"/>
-          <p:cNvSpPr txBox="1">
-            <a:spLocks noGrp="1"/>
-          </p:cNvSpPr>
-          <p:nvPr>
-            <p:ph type="subTitle" idx="1"/>
-          </p:nvPr>
-        </p:nvSpPr>
-        <p:spPr>
-          <a:xfrm>
-            <a:off x="1371600" y="3886200"/>
-            <a:ext cx="6400800" cy="1752600"/>
-          </a:xfrm>
-          <a:prstGeom prst="rect">
-            <a:avLst/>
-          </a:prstGeom>
-          <a:noFill/>
-          <a:ln>
-            <a:noFill/>
-          </a:ln>
-        </p:spPr>
-        <p:txBody>
-          <a:bodyPr spcFirstLastPara="1" wrap="square" lIns="91425" tIns="45700" rIns="91425" bIns="45700" anchor="t" anchorCtr="0">
-            <a:normAutofit/>
-          </a:bodyPr>
-          <a:lstStyle/>
-          <a:p>
-            <a:pPr marL="0" lvl="0" indent="0" algn="ctr" rtl="0">
-              <a:lnSpc>
-                <a:spcPct val="100000"/>
-              </a:lnSpc>
-              <a:spcBef>
-                <a:spcPts val="640"/>
-              </a:spcBef>
-              <a:spcAft>
-                <a:spcPts val="0"/>
-              </a:spcAft>
-              <a:buClr>
-                <a:schemeClr val="dk2"/>
-              </a:buClr>
-              <a:buSzPts val="3200"/>
-              <a:buNone/>
-            </a:pPr>
-            <a:r>
-              <a:rPr lang="pt-BR" dirty="0" err="1"/>
-              <a:t>UniSenac</a:t>
-            </a:r>
-            <a:r>
-              <a:rPr lang="pt-BR" dirty="0"/>
-              <a:t> campus Pelotas</a:t>
-            </a:r>
-            <a:endParaRPr dirty="0"/>
-          </a:p>
-          <a:p>
-            <a:pPr marL="0" lvl="0" indent="0" algn="ctr" rtl="0">
-              <a:lnSpc>
-                <a:spcPct val="100000"/>
-              </a:lnSpc>
-              <a:spcBef>
-                <a:spcPts val="640"/>
-              </a:spcBef>
-              <a:spcAft>
-                <a:spcPts val="0"/>
-              </a:spcAft>
-              <a:buClr>
-                <a:schemeClr val="dk2"/>
-              </a:buClr>
-              <a:buSzPts val="3200"/>
-              <a:buNone/>
-            </a:pPr>
-            <a:r>
-              <a:rPr lang="pt-BR" dirty="0"/>
-              <a:t>Bernardo, Bryan, Eduarda, Valdemar e Yan</a:t>
-            </a:r>
-            <a:endParaRPr dirty="0"/>
           </a:p>
           <a:p>
             <a:pPr marL="0" lvl="0" indent="0" algn="ctr" rtl="0">
@@ -17934,7 +17586,7 @@
             </a:pPr>
             <a:r>
               <a:rPr lang="pt-BR" dirty="0"/>
-              <a:t>Perfil: Dono da Calçados Avenida, pai do Lorenzo.</a:t>
+              <a:t>Perfil: Dono da Pé na Ativa, pai do Lorenzo.</a:t>
             </a:r>
           </a:p>
           <a:p>
@@ -18303,7 +17955,7 @@
             </a:pPr>
             <a:r>
               <a:rPr lang="pt-BR" sz="2000" dirty="0"/>
-              <a:t>Manter saúde e bem-estar através de exercícios e maratonas. </a:t>
+              <a:t>Manter saúde e bem-estar através de exercícios e da participação em corridas de rua. </a:t>
             </a:r>
           </a:p>
           <a:p>
@@ -18706,7 +18358,7 @@
         </p:nvSpPr>
         <p:spPr>
           <a:xfrm>
-            <a:off x="457200" y="1340768"/>
+            <a:off x="457200" y="1350195"/>
             <a:ext cx="8229600" cy="4526100"/>
           </a:xfrm>
           <a:prstGeom prst="rect">
@@ -18719,7 +18371,7 @@
         </p:spPr>
         <p:txBody>
           <a:bodyPr spcFirstLastPara="1" wrap="square" lIns="91425" tIns="45700" rIns="91425" bIns="45700" anchor="t" anchorCtr="0">
-            <a:normAutofit fontScale="92500"/>
+            <a:normAutofit/>
           </a:bodyPr>
           <a:lstStyle/>
           <a:p>
@@ -18806,28 +18458,12 @@
               <a:t>: </a:t>
             </a:r>
             <a:r>
-              <a:rPr lang="pt-BR" i="1" dirty="0"/>
-              <a:t>Next.js</a:t>
-            </a:r>
-            <a:r>
-              <a:rPr lang="pt-BR" dirty="0"/>
-              <a:t> (</a:t>
-            </a:r>
-            <a:r>
-              <a:rPr lang="pt-BR" i="1" dirty="0"/>
-              <a:t>SSR</a:t>
+              <a:rPr lang="pt-BR" i="1" dirty="0" err="1"/>
+              <a:t>React</a:t>
             </a:r>
             <a:r>
               <a:rPr lang="pt-BR" dirty="0"/>
               <a:t> e </a:t>
-            </a:r>
-            <a:r>
-              <a:rPr lang="pt-BR" i="1" dirty="0"/>
-              <a:t>SEO</a:t>
-            </a:r>
-            <a:r>
-              <a:rPr lang="pt-BR" dirty="0"/>
-              <a:t>) e </a:t>
             </a:r>
             <a:r>
               <a:rPr lang="pt-BR" i="1" dirty="0" err="1"/>
@@ -18839,52 +18475,8 @@
             </a:r>
             <a:r>
               <a:rPr lang="pt-BR" dirty="0"/>
-              <a:t>. </a:t>
-            </a:r>
-          </a:p>
-          <a:p>
-            <a:pPr lvl="1">
-              <a:spcBef>
-                <a:spcPts val="0"/>
-              </a:spcBef>
-            </a:pPr>
-            <a:r>
-              <a:rPr lang="pt-BR" dirty="0"/>
-              <a:t>Back-</a:t>
-            </a:r>
-            <a:r>
-              <a:rPr lang="pt-BR" dirty="0" err="1"/>
-              <a:t>end</a:t>
-            </a:r>
-            <a:r>
-              <a:rPr lang="pt-BR" dirty="0"/>
-              <a:t>: </a:t>
-            </a:r>
-            <a:r>
-              <a:rPr lang="pt-BR" i="1" dirty="0"/>
-              <a:t>Express.js</a:t>
-            </a:r>
-            <a:r>
-              <a:rPr lang="pt-BR" dirty="0"/>
-              <a:t>, </a:t>
-            </a:r>
-            <a:r>
-              <a:rPr lang="pt-BR" i="1" dirty="0"/>
-              <a:t>Prisma ORM </a:t>
-            </a:r>
-            <a:r>
-              <a:rPr lang="pt-BR" dirty="0"/>
-              <a:t>e </a:t>
-            </a:r>
-            <a:r>
-              <a:rPr lang="pt-BR" i="1" dirty="0"/>
-              <a:t>RDBMS MySQL</a:t>
-            </a:r>
-            <a:r>
-              <a:rPr lang="pt-BR" dirty="0"/>
               <a:t>.</a:t>
             </a:r>
-            <a:endParaRPr dirty="0"/>
           </a:p>
         </p:txBody>
       </p:sp>
@@ -18939,7 +18531,7 @@
   <p:cSld>
     <p:spTree>
       <p:nvGrpSpPr>
-        <p:cNvPr id="1" name="Shape 138"/>
+        <p:cNvPr id="1" name="Shape 144"/>
         <p:cNvGrpSpPr/>
         <p:nvPr/>
       </p:nvGrpSpPr>
@@ -18953,18 +18545,18 @@
       </p:grpSpPr>
       <p:sp>
         <p:nvSpPr>
-          <p:cNvPr id="139" name="Google Shape;139;g2d4445bff6b_0_29"/>
+          <p:cNvPr id="145" name="Google Shape;145;g2d4445bff6b_0_6"/>
           <p:cNvSpPr txBox="1">
             <a:spLocks noGrp="1"/>
           </p:cNvSpPr>
           <p:nvPr>
-            <p:ph type="title"/>
+            <p:ph type="ctrTitle"/>
           </p:nvPr>
         </p:nvSpPr>
         <p:spPr>
           <a:xfrm>
-            <a:off x="467544" y="0"/>
-            <a:ext cx="8229600" cy="1143000"/>
+            <a:off x="685800" y="2130425"/>
+            <a:ext cx="7772400" cy="1470000"/>
           </a:xfrm>
           <a:prstGeom prst="rect">
             <a:avLst/>
@@ -18990,31 +18582,42 @@
               <a:spcAft>
                 <a:spcPts val="0"/>
               </a:spcAft>
+              <a:buClr>
+                <a:schemeClr val="dk2"/>
+              </a:buClr>
               <a:buSzPts val="4400"/>
+              <a:buFont typeface="Calibri"/>
               <a:buNone/>
             </a:pPr>
             <a:r>
-              <a:rPr lang="pt-BR"/>
-              <a:t>Referências</a:t>
+              <a:rPr lang="pt-BR" b="1" dirty="0"/>
+              <a:t>Sistema de e-commerce </a:t>
             </a:r>
-            <a:endParaRPr/>
+            <a:br>
+              <a:rPr lang="pt-BR" b="1" dirty="0"/>
+            </a:br>
+            <a:r>
+              <a:rPr lang="pt-BR" b="1" dirty="0"/>
+              <a:t>Pé na Ativa</a:t>
+            </a:r>
+            <a:endParaRPr sz="3700" b="1" dirty="0"/>
           </a:p>
         </p:txBody>
       </p:sp>
       <p:sp>
         <p:nvSpPr>
-          <p:cNvPr id="140" name="Google Shape;140;g2d4445bff6b_0_29"/>
+          <p:cNvPr id="146" name="Google Shape;146;g2d4445bff6b_0_6"/>
           <p:cNvSpPr txBox="1">
             <a:spLocks noGrp="1"/>
           </p:cNvSpPr>
           <p:nvPr>
-            <p:ph type="body" idx="1"/>
+            <p:ph type="subTitle" idx="1"/>
           </p:nvPr>
         </p:nvSpPr>
         <p:spPr>
           <a:xfrm>
-            <a:off x="457200" y="1340768"/>
-            <a:ext cx="8229600" cy="4526100"/>
+            <a:off x="1371600" y="3886200"/>
+            <a:ext cx="6400800" cy="1752600"/>
           </a:xfrm>
           <a:prstGeom prst="rect">
             <a:avLst/>
@@ -19030,58 +18633,73 @@
           </a:bodyPr>
           <a:lstStyle/>
           <a:p>
-            <a:pPr marL="457200" lvl="0" indent="-431800" algn="just" rtl="0">
-              <a:lnSpc>
-                <a:spcPct val="100000"/>
-              </a:lnSpc>
-              <a:spcBef>
-                <a:spcPts val="0"/>
-              </a:spcBef>
-              <a:spcAft>
-                <a:spcPts val="0"/>
-              </a:spcAft>
+            <a:pPr marL="0" lvl="0" indent="0" algn="ctr" rtl="0">
+              <a:lnSpc>
+                <a:spcPct val="100000"/>
+              </a:lnSpc>
+              <a:spcBef>
+                <a:spcPts val="640"/>
+              </a:spcBef>
+              <a:spcAft>
+                <a:spcPts val="0"/>
+              </a:spcAft>
+              <a:buClr>
+                <a:schemeClr val="dk2"/>
+              </a:buClr>
               <a:buSzPts val="3200"/>
-              <a:buChar char="❑"/>
+              <a:buNone/>
             </a:pPr>
-            <a:endParaRPr/>
+            <a:r>
+              <a:rPr lang="pt-BR" dirty="0" err="1"/>
+              <a:t>UniSenac</a:t>
+            </a:r>
+            <a:r>
+              <a:rPr lang="pt-BR" dirty="0"/>
+              <a:t> campus Pelotas</a:t>
+            </a:r>
+            <a:endParaRPr dirty="0"/>
           </a:p>
-        </p:txBody>
-      </p:sp>
-      <p:sp>
-        <p:nvSpPr>
-          <p:cNvPr id="2" name="Espaço Reservado para Número de Slide 1">
-            <a:extLst>
-              <a:ext uri="{FF2B5EF4-FFF2-40B4-BE49-F238E27FC236}">
-                <a16:creationId xmlns:a16="http://schemas.microsoft.com/office/drawing/2014/main" id="{61A121CF-08A6-2919-7F86-2CC97FD4B27F}"/>
-              </a:ext>
-            </a:extLst>
-          </p:cNvPr>
-          <p:cNvSpPr>
-            <a:spLocks noGrp="1"/>
-          </p:cNvSpPr>
-          <p:nvPr>
-            <p:ph type="sldNum" idx="12"/>
-          </p:nvPr>
-        </p:nvSpPr>
-        <p:spPr/>
-        <p:txBody>
-          <a:bodyPr/>
-          <a:lstStyle/>
           <a:p>
-            <a:pPr marL="0" lvl="0" indent="0" algn="r" rtl="0">
-              <a:spcBef>
-                <a:spcPts val="0"/>
-              </a:spcBef>
-              <a:spcAft>
-                <a:spcPts val="0"/>
-              </a:spcAft>
+            <a:pPr marL="0" lvl="0" indent="0" algn="ctr" rtl="0">
+              <a:lnSpc>
+                <a:spcPct val="100000"/>
+              </a:lnSpc>
+              <a:spcBef>
+                <a:spcPts val="640"/>
+              </a:spcBef>
+              <a:spcAft>
+                <a:spcPts val="0"/>
+              </a:spcAft>
+              <a:buClr>
+                <a:schemeClr val="dk2"/>
+              </a:buClr>
+              <a:buSzPts val="3200"/>
               <a:buNone/>
             </a:pPr>
-            <a:fld id="{00000000-1234-1234-1234-123412341234}" type="slidenum">
-              <a:rPr lang="pt-BR" smtClean="0"/>
-              <a:t>9</a:t>
-            </a:fld>
-            <a:endParaRPr lang="pt-BR"/>
+            <a:r>
+              <a:rPr lang="pt-BR" dirty="0"/>
+              <a:t>Bernardo, Bryan, Eduarda, Valdemar e Yan</a:t>
+            </a:r>
+            <a:endParaRPr dirty="0"/>
+          </a:p>
+          <a:p>
+            <a:pPr marL="0" lvl="0" indent="0" algn="ctr" rtl="0">
+              <a:lnSpc>
+                <a:spcPct val="100000"/>
+              </a:lnSpc>
+              <a:spcBef>
+                <a:spcPts val="640"/>
+              </a:spcBef>
+              <a:spcAft>
+                <a:spcPts val="0"/>
+              </a:spcAft>
+              <a:buClr>
+                <a:schemeClr val="dk2"/>
+              </a:buClr>
+              <a:buSzPts val="3200"/>
+              <a:buNone/>
+            </a:pPr>
+            <a:endParaRPr dirty="0"/>
           </a:p>
         </p:txBody>
       </p:sp>

</xml_diff>